<commit_message>
algunos arreglos en las diapos
</commit_message>
<xml_diff>
--- a/Trabajo Practico/Presentacion/Presentación1.pptx
+++ b/Trabajo Practico/Presentacion/Presentación1.pptx
@@ -12,6 +12,10 @@
     <p:sldId id="260" r:id="rId6"/>
     <p:sldId id="261" r:id="rId7"/>
     <p:sldId id="262" r:id="rId8"/>
+    <p:sldId id="263" r:id="rId9"/>
+    <p:sldId id="264" r:id="rId10"/>
+    <p:sldId id="265" r:id="rId11"/>
+    <p:sldId id="266" r:id="rId12"/>
   </p:sldIdLst>
   <p:sldSz cx="9144000" cy="6858000" type="screen4x3"/>
   <p:notesSz cx="6858000" cy="9144000"/>
@@ -113,6 +117,163 @@
 </p:presentation>
 </file>
 
+<file path=ppt/charts/chart1.xml><?xml version="1.0" encoding="utf-8"?>
+<c:chartSpace xmlns:c="http://schemas.openxmlformats.org/drawingml/2006/chart" xmlns:a="http://schemas.openxmlformats.org/drawingml/2006/main" xmlns:r="http://schemas.openxmlformats.org/officeDocument/2006/relationships">
+  <c:date1904 val="1"/>
+  <c:lang val="es-AR"/>
+  <c:chart>
+    <c:title>
+      <c:tx>
+        <c:rich>
+          <a:bodyPr/>
+          <a:lstStyle/>
+          <a:p>
+            <a:pPr>
+              <a:defRPr/>
+            </a:pPr>
+            <a:r>
+              <a:rPr lang="es-AR"/>
+              <a:t>Cantidad</a:t>
+            </a:r>
+            <a:r>
+              <a:rPr lang="es-AR" baseline="0"/>
+              <a:t> de empleados por año</a:t>
+            </a:r>
+            <a:endParaRPr lang="es-AR"/>
+          </a:p>
+        </c:rich>
+      </c:tx>
+      <c:layout/>
+    </c:title>
+    <c:plotArea>
+      <c:layout/>
+      <c:barChart>
+        <c:barDir val="col"/>
+        <c:grouping val="clustered"/>
+        <c:ser>
+          <c:idx val="0"/>
+          <c:order val="0"/>
+          <c:tx>
+            <c:strRef>
+              <c:f>'[Hoja de cálculo en main]Hoja1'!$C$1</c:f>
+              <c:strCache>
+                <c:ptCount val="1"/>
+                <c:pt idx="0">
+                  <c:v>Empleados</c:v>
+                </c:pt>
+              </c:strCache>
+            </c:strRef>
+          </c:tx>
+          <c:cat>
+            <c:numRef>
+              <c:f>'[Hoja de cálculo en main]Hoja1'!$B$2:$B$10</c:f>
+              <c:numCache>
+                <c:formatCode>General</c:formatCode>
+                <c:ptCount val="9"/>
+                <c:pt idx="0">
+                  <c:v>2001</c:v>
+                </c:pt>
+                <c:pt idx="1">
+                  <c:v>2002</c:v>
+                </c:pt>
+                <c:pt idx="2">
+                  <c:v>2003</c:v>
+                </c:pt>
+                <c:pt idx="3">
+                  <c:v>2004</c:v>
+                </c:pt>
+                <c:pt idx="4">
+                  <c:v>2005</c:v>
+                </c:pt>
+                <c:pt idx="5">
+                  <c:v>2006</c:v>
+                </c:pt>
+                <c:pt idx="6">
+                  <c:v>2007</c:v>
+                </c:pt>
+                <c:pt idx="7">
+                  <c:v>2008</c:v>
+                </c:pt>
+                <c:pt idx="8">
+                  <c:v>2009</c:v>
+                </c:pt>
+              </c:numCache>
+            </c:numRef>
+          </c:cat>
+          <c:val>
+            <c:numRef>
+              <c:f>'[Hoja de cálculo en main]Hoja1'!$C$2:$C$10</c:f>
+              <c:numCache>
+                <c:formatCode>General</c:formatCode>
+                <c:ptCount val="9"/>
+                <c:pt idx="0">
+                  <c:v>35</c:v>
+                </c:pt>
+                <c:pt idx="1">
+                  <c:v>45</c:v>
+                </c:pt>
+                <c:pt idx="2">
+                  <c:v>60</c:v>
+                </c:pt>
+                <c:pt idx="3">
+                  <c:v>60</c:v>
+                </c:pt>
+                <c:pt idx="4">
+                  <c:v>75</c:v>
+                </c:pt>
+                <c:pt idx="5">
+                  <c:v>80</c:v>
+                </c:pt>
+                <c:pt idx="6">
+                  <c:v>110</c:v>
+                </c:pt>
+                <c:pt idx="7">
+                  <c:v>90</c:v>
+                </c:pt>
+                <c:pt idx="8">
+                  <c:v>40</c:v>
+                </c:pt>
+              </c:numCache>
+            </c:numRef>
+          </c:val>
+        </c:ser>
+        <c:axId val="79635584"/>
+        <c:axId val="84951808"/>
+      </c:barChart>
+      <c:catAx>
+        <c:axId val="79635584"/>
+        <c:scaling>
+          <c:orientation val="minMax"/>
+        </c:scaling>
+        <c:axPos val="b"/>
+        <c:numFmt formatCode="General" sourceLinked="1"/>
+        <c:tickLblPos val="nextTo"/>
+        <c:crossAx val="84951808"/>
+        <c:crosses val="autoZero"/>
+        <c:auto val="1"/>
+        <c:lblAlgn val="ctr"/>
+        <c:lblOffset val="100"/>
+      </c:catAx>
+      <c:valAx>
+        <c:axId val="84951808"/>
+        <c:scaling>
+          <c:orientation val="minMax"/>
+        </c:scaling>
+        <c:axPos val="l"/>
+        <c:majorGridlines/>
+        <c:numFmt formatCode="General" sourceLinked="1"/>
+        <c:tickLblPos val="nextTo"/>
+        <c:crossAx val="79635584"/>
+        <c:crosses val="autoZero"/>
+        <c:crossBetween val="between"/>
+      </c:valAx>
+    </c:plotArea>
+    <c:plotVisOnly val="1"/>
+  </c:chart>
+  <c:externalData r:id="rId1"/>
+</c:chartSpace>
+</file>
+
 <file path=ppt/slideLayouts/slideLayout1.xml><?xml version="1.0" encoding="utf-8"?>
 <p:sldLayout xmlns:a="http://schemas.openxmlformats.org/drawingml/2006/main" xmlns:r="http://schemas.openxmlformats.org/officeDocument/2006/relationships" xmlns:p="http://schemas.openxmlformats.org/presentationml/2006/main" showMasterSp="0" type="title" preserve="1">
   <p:cSld name="Diapositiva de título">
@@ -256,7 +417,8 @@
           <a:p>
             <a:fld id="{664E3C73-C4A4-430D-807B-8BAE622CED06}" type="datetimeFigureOut">
               <a:rPr lang="en-US" smtClean="0"/>
-              <a:t>11/23/2009</a:t>
+              <a:pPr/>
+              <a:t>11/24/2009</a:t>
             </a:fld>
             <a:endParaRPr lang="en-US"/>
           </a:p>
@@ -308,6 +470,7 @@
           <a:p>
             <a:fld id="{03E1C713-03F6-4AC5-B547-F4E901069C0A}" type="slidenum">
               <a:rPr lang="en-US" smtClean="0"/>
+              <a:pPr/>
               <a:t>‹Nº›</a:t>
             </a:fld>
             <a:endParaRPr lang="en-US"/>
@@ -615,7 +778,8 @@
           <a:p>
             <a:fld id="{664E3C73-C4A4-430D-807B-8BAE622CED06}" type="datetimeFigureOut">
               <a:rPr lang="en-US" smtClean="0"/>
-              <a:t>11/23/2009</a:t>
+              <a:pPr/>
+              <a:t>11/24/2009</a:t>
             </a:fld>
             <a:endParaRPr lang="en-US"/>
           </a:p>
@@ -657,6 +821,7 @@
           <a:p>
             <a:fld id="{03E1C713-03F6-4AC5-B547-F4E901069C0A}" type="slidenum">
               <a:rPr lang="en-US" smtClean="0"/>
+              <a:pPr/>
               <a:t>‹Nº›</a:t>
             </a:fld>
             <a:endParaRPr lang="en-US"/>
@@ -790,7 +955,8 @@
           <a:p>
             <a:fld id="{664E3C73-C4A4-430D-807B-8BAE622CED06}" type="datetimeFigureOut">
               <a:rPr lang="en-US" smtClean="0"/>
-              <a:t>11/23/2009</a:t>
+              <a:pPr/>
+              <a:t>11/24/2009</a:t>
             </a:fld>
             <a:endParaRPr lang="en-US"/>
           </a:p>
@@ -832,6 +998,7 @@
           <a:p>
             <a:fld id="{03E1C713-03F6-4AC5-B547-F4E901069C0A}" type="slidenum">
               <a:rPr lang="en-US" smtClean="0"/>
+              <a:pPr/>
               <a:t>‹Nº›</a:t>
             </a:fld>
             <a:endParaRPr lang="en-US"/>
@@ -1025,7 +1192,8 @@
           <a:p>
             <a:fld id="{664E3C73-C4A4-430D-807B-8BAE622CED06}" type="datetimeFigureOut">
               <a:rPr lang="en-US" smtClean="0"/>
-              <a:t>11/23/2009</a:t>
+              <a:pPr/>
+              <a:t>11/24/2009</a:t>
             </a:fld>
             <a:endParaRPr lang="en-US"/>
           </a:p>
@@ -1067,6 +1235,7 @@
           <a:p>
             <a:fld id="{03E1C713-03F6-4AC5-B547-F4E901069C0A}" type="slidenum">
               <a:rPr lang="en-US" smtClean="0"/>
+              <a:pPr/>
               <a:t>‹Nº›</a:t>
             </a:fld>
             <a:endParaRPr lang="en-US"/>
@@ -1294,7 +1463,8 @@
           <a:p>
             <a:fld id="{664E3C73-C4A4-430D-807B-8BAE622CED06}" type="datetimeFigureOut">
               <a:rPr lang="en-US" smtClean="0"/>
-              <a:t>11/23/2009</a:t>
+              <a:pPr/>
+              <a:t>11/24/2009</a:t>
             </a:fld>
             <a:endParaRPr lang="en-US"/>
           </a:p>
@@ -1346,6 +1516,7 @@
           <a:p>
             <a:fld id="{03E1C713-03F6-4AC5-B547-F4E901069C0A}" type="slidenum">
               <a:rPr lang="en-US" smtClean="0"/>
+              <a:pPr/>
               <a:t>‹Nº›</a:t>
             </a:fld>
             <a:endParaRPr lang="en-US"/>
@@ -1514,7 +1685,8 @@
           <a:p>
             <a:fld id="{664E3C73-C4A4-430D-807B-8BAE622CED06}" type="datetimeFigureOut">
               <a:rPr lang="en-US" smtClean="0"/>
-              <a:t>11/23/2009</a:t>
+              <a:pPr/>
+              <a:t>11/24/2009</a:t>
             </a:fld>
             <a:endParaRPr lang="en-US"/>
           </a:p>
@@ -1556,6 +1728,7 @@
           <a:p>
             <a:fld id="{03E1C713-03F6-4AC5-B547-F4E901069C0A}" type="slidenum">
               <a:rPr lang="en-US" smtClean="0"/>
+              <a:pPr/>
               <a:t>‹Nº›</a:t>
             </a:fld>
             <a:endParaRPr lang="en-US"/>
@@ -1866,7 +2039,8 @@
           <a:p>
             <a:fld id="{664E3C73-C4A4-430D-807B-8BAE622CED06}" type="datetimeFigureOut">
               <a:rPr lang="en-US" smtClean="0"/>
-              <a:t>11/23/2009</a:t>
+              <a:pPr/>
+              <a:t>11/24/2009</a:t>
             </a:fld>
             <a:endParaRPr lang="en-US"/>
           </a:p>
@@ -1908,6 +2082,7 @@
           <a:p>
             <a:fld id="{03E1C713-03F6-4AC5-B547-F4E901069C0A}" type="slidenum">
               <a:rPr lang="en-US" smtClean="0"/>
+              <a:pPr/>
               <a:t>‹Nº›</a:t>
             </a:fld>
             <a:endParaRPr lang="en-US"/>
@@ -2098,7 +2273,8 @@
           <a:p>
             <a:fld id="{664E3C73-C4A4-430D-807B-8BAE622CED06}" type="datetimeFigureOut">
               <a:rPr lang="en-US" smtClean="0"/>
-              <a:t>11/23/2009</a:t>
+              <a:pPr/>
+              <a:t>11/24/2009</a:t>
             </a:fld>
             <a:endParaRPr lang="en-US"/>
           </a:p>
@@ -2140,6 +2316,7 @@
           <a:p>
             <a:fld id="{03E1C713-03F6-4AC5-B547-F4E901069C0A}" type="slidenum">
               <a:rPr lang="en-US" smtClean="0"/>
+              <a:pPr/>
               <a:t>‹Nº›</a:t>
             </a:fld>
             <a:endParaRPr lang="en-US"/>
@@ -2238,7 +2415,8 @@
           <a:p>
             <a:fld id="{664E3C73-C4A4-430D-807B-8BAE622CED06}" type="datetimeFigureOut">
               <a:rPr lang="en-US" smtClean="0"/>
-              <a:t>11/23/2009</a:t>
+              <a:pPr/>
+              <a:t>11/24/2009</a:t>
             </a:fld>
             <a:endParaRPr lang="en-US"/>
           </a:p>
@@ -2280,6 +2458,7 @@
           <a:p>
             <a:fld id="{03E1C713-03F6-4AC5-B547-F4E901069C0A}" type="slidenum">
               <a:rPr lang="en-US" smtClean="0"/>
+              <a:pPr/>
               <a:t>‹Nº›</a:t>
             </a:fld>
             <a:endParaRPr lang="en-US"/>
@@ -2515,7 +2694,8 @@
           <a:p>
             <a:fld id="{664E3C73-C4A4-430D-807B-8BAE622CED06}" type="datetimeFigureOut">
               <a:rPr lang="en-US" smtClean="0"/>
-              <a:t>11/23/2009</a:t>
+              <a:pPr/>
+              <a:t>11/24/2009</a:t>
             </a:fld>
             <a:endParaRPr lang="en-US"/>
           </a:p>
@@ -2557,6 +2737,7 @@
           <a:p>
             <a:fld id="{03E1C713-03F6-4AC5-B547-F4E901069C0A}" type="slidenum">
               <a:rPr lang="en-US" smtClean="0"/>
+              <a:pPr/>
               <a:t>‹Nº›</a:t>
             </a:fld>
             <a:endParaRPr lang="en-US"/>
@@ -2922,7 +3103,8 @@
           <a:p>
             <a:fld id="{664E3C73-C4A4-430D-807B-8BAE622CED06}" type="datetimeFigureOut">
               <a:rPr lang="en-US" smtClean="0"/>
-              <a:t>11/23/2009</a:t>
+              <a:pPr/>
+              <a:t>11/24/2009</a:t>
             </a:fld>
             <a:endParaRPr lang="en-US"/>
           </a:p>
@@ -2964,6 +3146,7 @@
           <a:p>
             <a:fld id="{03E1C713-03F6-4AC5-B547-F4E901069C0A}" type="slidenum">
               <a:rPr lang="en-US" smtClean="0"/>
+              <a:pPr/>
               <a:t>‹Nº›</a:t>
             </a:fld>
             <a:endParaRPr lang="en-US"/>
@@ -3260,7 +3443,8 @@
           <a:p>
             <a:fld id="{664E3C73-C4A4-430D-807B-8BAE622CED06}" type="datetimeFigureOut">
               <a:rPr lang="en-US" smtClean="0"/>
-              <a:t>11/23/2009</a:t>
+              <a:pPr/>
+              <a:t>11/24/2009</a:t>
             </a:fld>
             <a:endParaRPr lang="en-US"/>
           </a:p>
@@ -3334,6 +3518,7 @@
           <a:p>
             <a:fld id="{03E1C713-03F6-4AC5-B547-F4E901069C0A}" type="slidenum">
               <a:rPr lang="en-US" smtClean="0"/>
+              <a:pPr/>
               <a:t>‹Nº›</a:t>
             </a:fld>
             <a:endParaRPr lang="en-US"/>
@@ -3800,7 +3985,7 @@
           <p:nvPr/>
         </p:nvPicPr>
         <p:blipFill>
-          <a:blip r:embed="rId2"/>
+          <a:blip r:embed="rId2" cstate="print"/>
           <a:stretch>
             <a:fillRect/>
           </a:stretch>
@@ -3815,6 +4000,227 @@
           </a:prstGeom>
         </p:spPr>
       </p:pic>
+    </p:spTree>
+  </p:cSld>
+  <p:clrMapOvr>
+    <a:masterClrMapping/>
+  </p:clrMapOvr>
+  <p:timing>
+    <p:tnLst>
+      <p:par>
+        <p:cTn id="1" dur="indefinite" restart="never" nodeType="tmRoot"/>
+      </p:par>
+    </p:tnLst>
+  </p:timing>
+</p:sld>
+</file>
+
+<file path=ppt/slides/slide10.xml><?xml version="1.0" encoding="utf-8"?>
+<p:sld xmlns:a="http://schemas.openxmlformats.org/drawingml/2006/main" xmlns:r="http://schemas.openxmlformats.org/officeDocument/2006/relationships" xmlns:p="http://schemas.openxmlformats.org/presentationml/2006/main">
+  <p:cSld>
+    <p:spTree>
+      <p:nvGrpSpPr>
+        <p:cNvPr id="1" name=""/>
+        <p:cNvGrpSpPr/>
+        <p:nvPr/>
+      </p:nvGrpSpPr>
+      <p:grpSpPr>
+        <a:xfrm>
+          <a:off x="0" y="0"/>
+          <a:ext cx="0" cy="0"/>
+          <a:chOff x="0" y="0"/>
+          <a:chExt cx="0" cy="0"/>
+        </a:xfrm>
+      </p:grpSpPr>
+      <p:sp>
+        <p:nvSpPr>
+          <p:cNvPr id="2" name="1 Título"/>
+          <p:cNvSpPr>
+            <a:spLocks noGrp="1"/>
+          </p:cNvSpPr>
+          <p:nvPr>
+            <p:ph type="title"/>
+          </p:nvPr>
+        </p:nvSpPr>
+        <p:spPr/>
+        <p:txBody>
+          <a:bodyPr/>
+          <a:lstStyle/>
+          <a:p>
+            <a:r>
+              <a:rPr lang="es-AR" dirty="0" smtClean="0"/>
+              <a:t>Organigrama propuesto</a:t>
+            </a:r>
+            <a:endParaRPr lang="es-AR" dirty="0"/>
+          </a:p>
+        </p:txBody>
+      </p:sp>
+      <p:pic>
+        <p:nvPicPr>
+          <p:cNvPr id="4" name="3 Marcador de contenido" descr="organigramaNuevo.JPG"/>
+          <p:cNvPicPr>
+            <a:picLocks noGrp="1" noChangeAspect="1"/>
+          </p:cNvPicPr>
+          <p:nvPr>
+            <p:ph sz="quarter" idx="1"/>
+          </p:nvPr>
+        </p:nvPicPr>
+        <p:blipFill>
+          <a:blip r:embed="rId2" cstate="print"/>
+          <a:stretch>
+            <a:fillRect/>
+          </a:stretch>
+        </p:blipFill>
+        <p:spPr>
+          <a:xfrm>
+            <a:off x="561975" y="1444625"/>
+            <a:ext cx="8020050" cy="4486275"/>
+          </a:xfrm>
+        </p:spPr>
+      </p:pic>
+    </p:spTree>
+  </p:cSld>
+  <p:clrMapOvr>
+    <a:masterClrMapping/>
+  </p:clrMapOvr>
+  <p:timing>
+    <p:tnLst>
+      <p:par>
+        <p:cTn id="1" dur="indefinite" restart="never" nodeType="tmRoot"/>
+      </p:par>
+    </p:tnLst>
+  </p:timing>
+</p:sld>
+</file>
+
+<file path=ppt/slides/slide11.xml><?xml version="1.0" encoding="utf-8"?>
+<p:sld xmlns:a="http://schemas.openxmlformats.org/drawingml/2006/main" xmlns:r="http://schemas.openxmlformats.org/officeDocument/2006/relationships" xmlns:p="http://schemas.openxmlformats.org/presentationml/2006/main">
+  <p:cSld>
+    <p:spTree>
+      <p:nvGrpSpPr>
+        <p:cNvPr id="1" name=""/>
+        <p:cNvGrpSpPr/>
+        <p:nvPr/>
+      </p:nvGrpSpPr>
+      <p:grpSpPr>
+        <a:xfrm>
+          <a:off x="0" y="0"/>
+          <a:ext cx="0" cy="0"/>
+          <a:chOff x="0" y="0"/>
+          <a:chExt cx="0" cy="0"/>
+        </a:xfrm>
+      </p:grpSpPr>
+      <p:sp>
+        <p:nvSpPr>
+          <p:cNvPr id="2" name="1 Título"/>
+          <p:cNvSpPr>
+            <a:spLocks noGrp="1"/>
+          </p:cNvSpPr>
+          <p:nvPr>
+            <p:ph type="title"/>
+          </p:nvPr>
+        </p:nvSpPr>
+        <p:spPr/>
+        <p:txBody>
+          <a:bodyPr/>
+          <a:lstStyle/>
+          <a:p>
+            <a:r>
+              <a:rPr lang="es-AR" dirty="0" smtClean="0"/>
+              <a:t>Propuestas de Cambio (II)</a:t>
+            </a:r>
+            <a:endParaRPr lang="es-AR" dirty="0"/>
+          </a:p>
+        </p:txBody>
+      </p:sp>
+      <p:sp>
+        <p:nvSpPr>
+          <p:cNvPr id="3" name="2 Marcador de contenido"/>
+          <p:cNvSpPr>
+            <a:spLocks noGrp="1"/>
+          </p:cNvSpPr>
+          <p:nvPr>
+            <p:ph sz="quarter" idx="1"/>
+          </p:nvPr>
+        </p:nvSpPr>
+        <p:spPr/>
+        <p:txBody>
+          <a:bodyPr/>
+          <a:lstStyle/>
+          <a:p>
+            <a:r>
+              <a:rPr lang="es-AR" dirty="0" smtClean="0"/>
+              <a:t>Ingeniería de Producto</a:t>
+            </a:r>
+          </a:p>
+          <a:p>
+            <a:pPr lvl="1"/>
+            <a:r>
+              <a:rPr lang="es-AR" dirty="0" smtClean="0"/>
+              <a:t>Gerencia </a:t>
+            </a:r>
+            <a:r>
+              <a:rPr lang="es-AR" dirty="0" smtClean="0"/>
+              <a:t>de Comercialización que </a:t>
+            </a:r>
+            <a:r>
+              <a:rPr lang="es-AR" dirty="0" smtClean="0"/>
+              <a:t>nuclea </a:t>
+            </a:r>
+            <a:r>
+              <a:rPr lang="es-AR" dirty="0" smtClean="0"/>
+              <a:t>el área de Marketing y Promoción y la de Ventas permitiendo la integración de sus </a:t>
+            </a:r>
+            <a:r>
+              <a:rPr lang="es-AR" dirty="0" smtClean="0"/>
+              <a:t>trabajos</a:t>
+            </a:r>
+          </a:p>
+          <a:p>
+            <a:pPr lvl="1"/>
+            <a:r>
+              <a:rPr lang="es-AR" dirty="0" smtClean="0"/>
+              <a:t>Análisis profundo de mercado para crear nuevos productos con salida</a:t>
+            </a:r>
+          </a:p>
+          <a:p>
+            <a:pPr lvl="1"/>
+            <a:r>
+              <a:rPr lang="es-AR" dirty="0" smtClean="0"/>
+              <a:t>Focalizar esfuerzos en pocos productos</a:t>
+            </a:r>
+          </a:p>
+          <a:p>
+            <a:pPr lvl="1"/>
+            <a:endParaRPr lang="es-AR" dirty="0" smtClean="0"/>
+          </a:p>
+          <a:p>
+            <a:r>
+              <a:rPr lang="es-AR" dirty="0" smtClean="0"/>
+              <a:t>Imagen Comercial</a:t>
+            </a:r>
+          </a:p>
+          <a:p>
+            <a:pPr lvl="1"/>
+            <a:r>
+              <a:rPr lang="es-AR" dirty="0" smtClean="0"/>
+              <a:t>Cambio de nombre</a:t>
+            </a:r>
+          </a:p>
+          <a:p>
+            <a:pPr lvl="1">
+              <a:buNone/>
+            </a:pPr>
+            <a:endParaRPr lang="es-AR" dirty="0" smtClean="0"/>
+          </a:p>
+          <a:p>
+            <a:pPr>
+              <a:buNone/>
+            </a:pPr>
+            <a:endParaRPr lang="es-AR" dirty="0"/>
+          </a:p>
+        </p:txBody>
+      </p:sp>
     </p:spTree>
   </p:cSld>
   <p:clrMapOvr>
@@ -3890,7 +4296,9 @@
         </p:nvSpPr>
         <p:spPr/>
         <p:txBody>
-          <a:bodyPr/>
+          <a:bodyPr>
+            <a:normAutofit/>
+          </a:bodyPr>
           <a:lstStyle/>
           <a:p>
             <a:r>
@@ -3929,10 +4337,7 @@
               <a:rPr lang="en-US" dirty="0" err="1" smtClean="0"/>
               <a:t>Espania</a:t>
             </a:r>
-            <a:r>
-              <a:rPr lang="en-US" dirty="0" smtClean="0"/>
-              <a:t>.</a:t>
-            </a:r>
+            <a:endParaRPr lang="en-US" dirty="0" smtClean="0"/>
           </a:p>
           <a:p>
             <a:r>
@@ -3987,10 +4392,7 @@
               <a:rPr lang="en-US" dirty="0" err="1" smtClean="0"/>
               <a:t>minorista</a:t>
             </a:r>
-            <a:r>
-              <a:rPr lang="en-US" dirty="0" smtClean="0"/>
-              <a:t>.</a:t>
-            </a:r>
+            <a:endParaRPr lang="en-US" dirty="0" smtClean="0"/>
           </a:p>
           <a:p>
             <a:r>
@@ -3999,7 +4401,7 @@
             </a:r>
             <a:r>
               <a:rPr lang="en-US" dirty="0" err="1" smtClean="0"/>
-              <a:t>anios</a:t>
+              <a:t>años</a:t>
             </a:r>
             <a:r>
               <a:rPr lang="en-US" dirty="0" smtClean="0"/>
@@ -4049,10 +4451,7 @@
               <a:rPr lang="en-US" dirty="0" err="1" smtClean="0"/>
               <a:t>filiales</a:t>
             </a:r>
-            <a:r>
-              <a:rPr lang="en-US" dirty="0" smtClean="0"/>
-              <a:t>.</a:t>
-            </a:r>
+            <a:endParaRPr lang="en-US" dirty="0" smtClean="0"/>
           </a:p>
           <a:p>
             <a:r>
@@ -4081,7 +4480,11 @@
             </a:r>
             <a:r>
               <a:rPr lang="en-US" dirty="0" err="1" smtClean="0"/>
-              <a:t>exito</a:t>
+              <a:t>é</a:t>
+            </a:r>
+            <a:r>
+              <a:rPr lang="en-US" dirty="0" err="1" smtClean="0"/>
+              <a:t>xito</a:t>
             </a:r>
             <a:r>
               <a:rPr lang="en-US" dirty="0" smtClean="0"/>
@@ -4139,10 +4542,7 @@
               <a:rPr lang="en-US" dirty="0" err="1" smtClean="0"/>
               <a:t>convertibilidad</a:t>
             </a:r>
-            <a:r>
-              <a:rPr lang="en-US" dirty="0" smtClean="0"/>
-              <a:t>.</a:t>
-            </a:r>
+            <a:endParaRPr lang="en-US" dirty="0" smtClean="0"/>
           </a:p>
           <a:p>
             <a:r>
@@ -4159,7 +4559,7 @@
             </a:r>
             <a:r>
               <a:rPr lang="en-US" dirty="0" err="1" smtClean="0"/>
-              <a:t>anios</a:t>
+              <a:t>años</a:t>
             </a:r>
             <a:r>
               <a:rPr lang="en-US" dirty="0" smtClean="0"/>
@@ -4187,7 +4587,11 @@
             </a:r>
             <a:r>
               <a:rPr lang="en-US" dirty="0" smtClean="0"/>
-              <a:t> Argentina</a:t>
+              <a:t> Argentina </a:t>
+            </a:r>
+            <a:r>
+              <a:rPr lang="en-US" dirty="0" err="1" smtClean="0"/>
+              <a:t>atraviesa</a:t>
             </a:r>
             <a:r>
               <a:rPr lang="en-US" dirty="0" smtClean="0"/>
@@ -4195,7 +4599,23 @@
             </a:r>
             <a:r>
               <a:rPr lang="en-US" dirty="0" err="1" smtClean="0"/>
-              <a:t>atraviesa</a:t>
+              <a:t>una</a:t>
+            </a:r>
+            <a:r>
+              <a:rPr lang="en-US" dirty="0" smtClean="0"/>
+              <a:t> crisis, la </a:t>
+            </a:r>
+            <a:r>
+              <a:rPr lang="en-US" dirty="0" err="1" smtClean="0"/>
+              <a:t>cual</a:t>
+            </a:r>
+            <a:r>
+              <a:rPr lang="en-US" dirty="0" smtClean="0"/>
+              <a:t> pone en </a:t>
+            </a:r>
+            <a:r>
+              <a:rPr lang="en-US" dirty="0" err="1" smtClean="0"/>
+              <a:t>jaque</a:t>
             </a:r>
             <a:r>
               <a:rPr lang="en-US" dirty="0" smtClean="0"/>
@@ -4203,23 +4623,7 @@
             </a:r>
             <a:r>
               <a:rPr lang="en-US" dirty="0" err="1" smtClean="0"/>
-              <a:t>una</a:t>
-            </a:r>
-            <a:r>
-              <a:rPr lang="en-US" dirty="0" smtClean="0"/>
-              <a:t> crisis, la </a:t>
-            </a:r>
-            <a:r>
-              <a:rPr lang="en-US" dirty="0" err="1" smtClean="0"/>
-              <a:t>cual</a:t>
-            </a:r>
-            <a:r>
-              <a:rPr lang="en-US" dirty="0" smtClean="0"/>
-              <a:t> pone en </a:t>
-            </a:r>
-            <a:r>
-              <a:rPr lang="en-US" dirty="0" err="1" smtClean="0"/>
-              <a:t>jaque</a:t>
+              <a:t>su</a:t>
             </a:r>
             <a:r>
               <a:rPr lang="en-US" dirty="0" smtClean="0"/>
@@ -4227,19 +4631,7 @@
             </a:r>
             <a:r>
               <a:rPr lang="en-US" dirty="0" err="1" smtClean="0"/>
-              <a:t>su</a:t>
-            </a:r>
-            <a:r>
-              <a:rPr lang="en-US" dirty="0" smtClean="0"/>
-              <a:t> </a:t>
-            </a:r>
-            <a:r>
-              <a:rPr lang="en-US" dirty="0" err="1" smtClean="0"/>
               <a:t>existencia</a:t>
-            </a:r>
-            <a:r>
-              <a:rPr lang="en-US" dirty="0" smtClean="0"/>
-              <a:t>.</a:t>
             </a:r>
             <a:endParaRPr lang="en-US" dirty="0" smtClean="0"/>
           </a:p>
@@ -4256,6 +4648,13 @@
   <p:clrMapOvr>
     <a:masterClrMapping/>
   </p:clrMapOvr>
+  <p:timing>
+    <p:tnLst>
+      <p:par>
+        <p:cTn id="1" dur="indefinite" restart="never" nodeType="tmRoot"/>
+      </p:par>
+    </p:tnLst>
+  </p:timing>
 </p:sld>
 </file>
 
@@ -4318,7 +4717,7 @@
           </p:nvPr>
         </p:nvPicPr>
         <p:blipFill>
-          <a:blip r:embed="rId2"/>
+          <a:blip r:embed="rId2" cstate="print"/>
           <a:stretch>
             <a:fillRect/>
           </a:stretch>
@@ -4335,6 +4734,13 @@
   <p:clrMapOvr>
     <a:masterClrMapping/>
   </p:clrMapOvr>
+  <p:timing>
+    <p:tnLst>
+      <p:par>
+        <p:cTn id="1" dur="indefinite" restart="never" nodeType="tmRoot"/>
+      </p:par>
+    </p:tnLst>
+  </p:timing>
 </p:sld>
 </file>
 
@@ -4416,9 +4822,177 @@
         </p:nvSpPr>
         <p:spPr/>
         <p:txBody>
-          <a:bodyPr/>
-          <a:lstStyle/>
-          <a:p>
+          <a:bodyPr>
+            <a:normAutofit lnSpcReduction="10000"/>
+          </a:bodyPr>
+          <a:lstStyle/>
+          <a:p>
+            <a:r>
+              <a:rPr lang="en-US" dirty="0" err="1" smtClean="0"/>
+              <a:t>Necesidad</a:t>
+            </a:r>
+            <a:r>
+              <a:rPr lang="en-US" dirty="0" smtClean="0"/>
+              <a:t> de </a:t>
+            </a:r>
+            <a:r>
+              <a:rPr lang="en-US" dirty="0" err="1" smtClean="0"/>
+              <a:t>reestructuración</a:t>
+            </a:r>
+            <a:endParaRPr lang="en-US" dirty="0" smtClean="0"/>
+          </a:p>
+          <a:p>
+            <a:pPr lvl="1"/>
+            <a:r>
+              <a:rPr lang="en-US" dirty="0" err="1" smtClean="0"/>
+              <a:t>Estrato</a:t>
+            </a:r>
+            <a:r>
+              <a:rPr lang="en-US" dirty="0" smtClean="0"/>
+              <a:t> </a:t>
+            </a:r>
+            <a:r>
+              <a:rPr lang="en-US" dirty="0" err="1" smtClean="0"/>
+              <a:t>dirigencial</a:t>
+            </a:r>
+            <a:r>
+              <a:rPr lang="en-US" dirty="0" smtClean="0"/>
+              <a:t> </a:t>
+            </a:r>
+            <a:r>
+              <a:rPr lang="en-US" dirty="0" err="1" smtClean="0"/>
+              <a:t>sobredimensionado</a:t>
+            </a:r>
+            <a:endParaRPr lang="en-US" dirty="0" smtClean="0"/>
+          </a:p>
+          <a:p>
+            <a:pPr lvl="1"/>
+            <a:r>
+              <a:rPr lang="en-US" dirty="0" err="1" smtClean="0"/>
+              <a:t>Estructura</a:t>
+            </a:r>
+            <a:r>
+              <a:rPr lang="en-US" dirty="0" smtClean="0"/>
+              <a:t> </a:t>
+            </a:r>
+            <a:r>
+              <a:rPr lang="en-US" dirty="0" err="1" smtClean="0"/>
+              <a:t>inadecuada</a:t>
+            </a:r>
+            <a:r>
+              <a:rPr lang="en-US" dirty="0" smtClean="0"/>
+              <a:t> </a:t>
+            </a:r>
+            <a:r>
+              <a:rPr lang="en-US" dirty="0" err="1" smtClean="0"/>
+              <a:t>luego</a:t>
+            </a:r>
+            <a:r>
+              <a:rPr lang="en-US" dirty="0" smtClean="0"/>
+              <a:t> de </a:t>
+            </a:r>
+            <a:r>
+              <a:rPr lang="en-US" dirty="0" err="1" smtClean="0"/>
+              <a:t>importantes</a:t>
+            </a:r>
+            <a:r>
+              <a:rPr lang="en-US" dirty="0" smtClean="0"/>
+              <a:t> </a:t>
+            </a:r>
+            <a:r>
+              <a:rPr lang="en-US" dirty="0" err="1" smtClean="0"/>
+              <a:t>recortes</a:t>
+            </a:r>
+            <a:r>
+              <a:rPr lang="en-US" dirty="0" smtClean="0"/>
+              <a:t> de </a:t>
+            </a:r>
+            <a:r>
+              <a:rPr lang="en-US" dirty="0" smtClean="0"/>
+              <a:t>personal</a:t>
+            </a:r>
+          </a:p>
+          <a:p>
+            <a:pPr lvl="1"/>
+            <a:r>
+              <a:rPr lang="en-US" dirty="0" err="1" smtClean="0"/>
+              <a:t>Incertidumbre</a:t>
+            </a:r>
+            <a:r>
+              <a:rPr lang="en-US" dirty="0" smtClean="0"/>
+              <a:t> de los </a:t>
+            </a:r>
+            <a:r>
+              <a:rPr lang="en-US" dirty="0" err="1" smtClean="0"/>
+              <a:t>empleados</a:t>
+            </a:r>
+            <a:r>
+              <a:rPr lang="en-US" dirty="0" smtClean="0"/>
+              <a:t> en </a:t>
+            </a:r>
+            <a:r>
+              <a:rPr lang="en-US" dirty="0" err="1" smtClean="0"/>
+              <a:t>cuanto</a:t>
+            </a:r>
+            <a:r>
+              <a:rPr lang="en-US" dirty="0" smtClean="0"/>
+              <a:t> a </a:t>
+            </a:r>
+            <a:r>
+              <a:rPr lang="en-US" dirty="0" err="1" smtClean="0"/>
+              <a:t>las</a:t>
+            </a:r>
+            <a:r>
+              <a:rPr lang="en-US" dirty="0" smtClean="0"/>
+              <a:t> </a:t>
+            </a:r>
+            <a:r>
+              <a:rPr lang="en-US" dirty="0" err="1" smtClean="0"/>
+              <a:t>funciones</a:t>
+            </a:r>
+            <a:r>
+              <a:rPr lang="en-US" dirty="0" smtClean="0"/>
+              <a:t> </a:t>
+            </a:r>
+            <a:r>
+              <a:rPr lang="en-US" dirty="0" err="1" smtClean="0"/>
+              <a:t>que</a:t>
+            </a:r>
+            <a:r>
+              <a:rPr lang="en-US" dirty="0" smtClean="0"/>
+              <a:t> </a:t>
+            </a:r>
+            <a:r>
+              <a:rPr lang="en-US" dirty="0" err="1" smtClean="0"/>
+              <a:t>deben</a:t>
+            </a:r>
+            <a:r>
+              <a:rPr lang="en-US" dirty="0" smtClean="0"/>
+              <a:t> </a:t>
+            </a:r>
+            <a:r>
+              <a:rPr lang="en-US" dirty="0" err="1" smtClean="0"/>
+              <a:t>desempeñar</a:t>
+            </a:r>
+            <a:endParaRPr lang="en-US" dirty="0" smtClean="0"/>
+          </a:p>
+          <a:p>
+            <a:r>
+              <a:rPr lang="en-US" dirty="0" err="1" smtClean="0"/>
+              <a:t>Manejo</a:t>
+            </a:r>
+            <a:r>
+              <a:rPr lang="en-US" dirty="0" smtClean="0"/>
+              <a:t> </a:t>
+            </a:r>
+            <a:r>
+              <a:rPr lang="en-US" dirty="0" err="1" smtClean="0"/>
+              <a:t>departamental</a:t>
+            </a:r>
+            <a:endParaRPr lang="en-US" dirty="0" smtClean="0"/>
+          </a:p>
+          <a:p>
+            <a:pPr lvl="1"/>
             <a:r>
               <a:rPr lang="en-US" dirty="0" err="1" smtClean="0"/>
               <a:t>Falta</a:t>
@@ -4429,7 +5003,7 @@
             </a:r>
             <a:r>
               <a:rPr lang="en-US" dirty="0" err="1" smtClean="0"/>
-              <a:t>conduccion</a:t>
+              <a:t>comunicación</a:t>
             </a:r>
             <a:r>
               <a:rPr lang="en-US" dirty="0" smtClean="0"/>
@@ -4437,136 +5011,166 @@
             </a:r>
             <a:r>
               <a:rPr lang="en-US" dirty="0" err="1" smtClean="0"/>
+              <a:t>colaboracion</a:t>
+            </a:r>
+            <a:r>
+              <a:rPr lang="en-US" dirty="0" smtClean="0"/>
+              <a:t> entre </a:t>
+            </a:r>
+            <a:r>
+              <a:rPr lang="en-US" dirty="0" err="1" smtClean="0"/>
+              <a:t>las</a:t>
+            </a:r>
+            <a:r>
+              <a:rPr lang="en-US" dirty="0" smtClean="0"/>
+              <a:t> </a:t>
+            </a:r>
+            <a:r>
+              <a:rPr lang="en-US" dirty="0" err="1" smtClean="0"/>
+              <a:t>distintas</a:t>
+            </a:r>
+            <a:r>
+              <a:rPr lang="en-US" dirty="0" smtClean="0"/>
+              <a:t> </a:t>
+            </a:r>
+            <a:r>
+              <a:rPr lang="en-US" dirty="0" err="1" smtClean="0"/>
+              <a:t>áreas</a:t>
+            </a:r>
+            <a:r>
+              <a:rPr lang="en-US" dirty="0" smtClean="0"/>
+              <a:t> y </a:t>
+            </a:r>
+            <a:r>
+              <a:rPr lang="en-US" dirty="0" err="1" smtClean="0"/>
+              <a:t>utilización</a:t>
+            </a:r>
+            <a:r>
+              <a:rPr lang="en-US" dirty="0" smtClean="0"/>
+              <a:t> de </a:t>
+            </a:r>
+            <a:r>
+              <a:rPr lang="en-US" dirty="0" err="1" smtClean="0"/>
+              <a:t>canales</a:t>
+            </a:r>
+            <a:r>
+              <a:rPr lang="en-US" dirty="0" smtClean="0"/>
+              <a:t> </a:t>
+            </a:r>
+            <a:r>
+              <a:rPr lang="en-US" dirty="0" err="1" smtClean="0"/>
+              <a:t>informales</a:t>
+            </a:r>
+            <a:endParaRPr lang="en-US" dirty="0" smtClean="0"/>
+          </a:p>
+          <a:p>
+            <a:pPr lvl="1"/>
+            <a:r>
+              <a:rPr lang="en-US" dirty="0" err="1" smtClean="0"/>
+              <a:t>Falta</a:t>
+            </a:r>
+            <a:r>
+              <a:rPr lang="en-US" dirty="0" smtClean="0"/>
+              <a:t> de </a:t>
+            </a:r>
+            <a:r>
+              <a:rPr lang="en-US" dirty="0" err="1" smtClean="0"/>
+              <a:t>reestructuración</a:t>
+            </a:r>
+            <a:r>
+              <a:rPr lang="en-US" dirty="0" smtClean="0"/>
+              <a:t> </a:t>
+            </a:r>
+            <a:r>
+              <a:rPr lang="en-US" dirty="0" err="1" smtClean="0"/>
+              <a:t>luego</a:t>
+            </a:r>
+            <a:r>
+              <a:rPr lang="en-US" dirty="0" smtClean="0"/>
+              <a:t> de </a:t>
+            </a:r>
+            <a:r>
+              <a:rPr lang="en-US" dirty="0" err="1" smtClean="0"/>
+              <a:t>importantes</a:t>
+            </a:r>
+            <a:r>
+              <a:rPr lang="en-US" dirty="0" smtClean="0"/>
+              <a:t> </a:t>
+            </a:r>
+            <a:r>
+              <a:rPr lang="en-US" dirty="0" err="1" smtClean="0"/>
+              <a:t>recortes</a:t>
+            </a:r>
+            <a:r>
+              <a:rPr lang="en-US" dirty="0" smtClean="0"/>
+              <a:t> de personal</a:t>
+            </a:r>
+          </a:p>
+          <a:p>
+            <a:r>
+              <a:rPr lang="en-US" dirty="0" err="1" smtClean="0"/>
+              <a:t>Falta</a:t>
+            </a:r>
+            <a:r>
+              <a:rPr lang="en-US" dirty="0" smtClean="0"/>
+              <a:t> </a:t>
+            </a:r>
+            <a:r>
+              <a:rPr lang="en-US" dirty="0" smtClean="0"/>
+              <a:t>de </a:t>
+            </a:r>
+            <a:r>
+              <a:rPr lang="en-US" dirty="0" err="1" smtClean="0"/>
+              <a:t>confianza</a:t>
+            </a:r>
+            <a:r>
+              <a:rPr lang="en-US" dirty="0" smtClean="0"/>
+              <a:t> en la </a:t>
+            </a:r>
+            <a:r>
+              <a:rPr lang="en-US" dirty="0" err="1" smtClean="0"/>
+              <a:t>Direccion</a:t>
+            </a:r>
+            <a:r>
+              <a:rPr lang="en-US" dirty="0" smtClean="0"/>
+              <a:t> </a:t>
+            </a:r>
+            <a:r>
+              <a:rPr lang="en-US" dirty="0" smtClean="0"/>
+              <a:t>General</a:t>
+            </a:r>
+          </a:p>
+          <a:p>
+            <a:pPr lvl="1"/>
+            <a:r>
+              <a:rPr lang="en-US" dirty="0" err="1" smtClean="0"/>
+              <a:t>Falta</a:t>
+            </a:r>
+            <a:r>
+              <a:rPr lang="en-US" dirty="0" smtClean="0"/>
+              <a:t> de </a:t>
+            </a:r>
+            <a:r>
+              <a:rPr lang="en-US" dirty="0" err="1" smtClean="0"/>
+              <a:t>conducción</a:t>
+            </a:r>
+            <a:r>
+              <a:rPr lang="en-US" dirty="0" smtClean="0"/>
+              <a:t> y </a:t>
+            </a:r>
+            <a:r>
+              <a:rPr lang="en-US" dirty="0" err="1" smtClean="0"/>
               <a:t>estrategia</a:t>
             </a:r>
             <a:r>
               <a:rPr lang="en-US" dirty="0" smtClean="0"/>
-              <a:t>.</a:t>
-            </a:r>
-          </a:p>
-          <a:p>
-            <a:r>
-              <a:rPr lang="en-US" dirty="0" err="1" smtClean="0"/>
-              <a:t>Estrato</a:t>
-            </a:r>
-            <a:r>
-              <a:rPr lang="en-US" dirty="0" smtClean="0"/>
               <a:t> </a:t>
             </a:r>
             <a:r>
               <a:rPr lang="en-US" dirty="0" err="1" smtClean="0"/>
-              <a:t>dirigencial</a:t>
-            </a:r>
-            <a:r>
-              <a:rPr lang="en-US" dirty="0" smtClean="0"/>
-              <a:t> </a:t>
-            </a:r>
-            <a:r>
-              <a:rPr lang="en-US" dirty="0" err="1" smtClean="0"/>
-              <a:t>sobredimensionado</a:t>
-            </a:r>
-            <a:r>
-              <a:rPr lang="en-US" dirty="0" smtClean="0"/>
-              <a:t>.</a:t>
-            </a:r>
-          </a:p>
-          <a:p>
-            <a:r>
-              <a:rPr lang="en-US" dirty="0" err="1" smtClean="0"/>
-              <a:t>Falta</a:t>
-            </a:r>
-            <a:r>
-              <a:rPr lang="en-US" dirty="0" smtClean="0"/>
-              <a:t> </a:t>
-            </a:r>
-            <a:r>
-              <a:rPr lang="en-US" dirty="0" smtClean="0"/>
-              <a:t>de </a:t>
-            </a:r>
-            <a:r>
-              <a:rPr lang="en-US" dirty="0" err="1" smtClean="0"/>
-              <a:t>comunicacion</a:t>
-            </a:r>
-            <a:r>
-              <a:rPr lang="en-US" dirty="0" smtClean="0"/>
-              <a:t> y </a:t>
-            </a:r>
-            <a:r>
-              <a:rPr lang="en-US" dirty="0" err="1" smtClean="0"/>
-              <a:t>colaboracion</a:t>
-            </a:r>
-            <a:r>
-              <a:rPr lang="en-US" dirty="0" smtClean="0"/>
-              <a:t> entre </a:t>
-            </a:r>
-            <a:r>
-              <a:rPr lang="en-US" dirty="0" err="1" smtClean="0"/>
-              <a:t>las</a:t>
-            </a:r>
-            <a:r>
-              <a:rPr lang="en-US" dirty="0" smtClean="0"/>
-              <a:t> areas.</a:t>
-            </a:r>
-          </a:p>
-          <a:p>
-            <a:r>
-              <a:rPr lang="en-US" dirty="0" err="1" smtClean="0"/>
-              <a:t>Falta</a:t>
-            </a:r>
-            <a:r>
-              <a:rPr lang="en-US" dirty="0" smtClean="0"/>
-              <a:t> de </a:t>
-            </a:r>
-            <a:r>
-              <a:rPr lang="en-US" dirty="0" err="1" smtClean="0"/>
-              <a:t>reestructuracion</a:t>
-            </a:r>
-            <a:r>
-              <a:rPr lang="en-US" dirty="0" smtClean="0"/>
-              <a:t> </a:t>
-            </a:r>
-            <a:r>
-              <a:rPr lang="en-US" dirty="0" err="1" smtClean="0"/>
-              <a:t>luego</a:t>
-            </a:r>
-            <a:r>
-              <a:rPr lang="en-US" dirty="0" smtClean="0"/>
-              <a:t> de los </a:t>
-            </a:r>
-            <a:r>
-              <a:rPr lang="en-US" dirty="0" err="1" smtClean="0"/>
-              <a:t>recortes</a:t>
-            </a:r>
-            <a:r>
-              <a:rPr lang="en-US" dirty="0" smtClean="0"/>
-              <a:t> de personal.</a:t>
-            </a:r>
-          </a:p>
-          <a:p>
-            <a:r>
-              <a:rPr lang="en-US" dirty="0" err="1" smtClean="0"/>
-              <a:t>Poca</a:t>
-            </a:r>
-            <a:r>
-              <a:rPr lang="en-US" dirty="0" smtClean="0"/>
-              <a:t> </a:t>
-            </a:r>
-            <a:r>
-              <a:rPr lang="en-US" dirty="0" err="1" smtClean="0"/>
-              <a:t>confianza</a:t>
-            </a:r>
-            <a:r>
-              <a:rPr lang="en-US" dirty="0" smtClean="0"/>
-              <a:t> en la </a:t>
-            </a:r>
-            <a:r>
-              <a:rPr lang="en-US" dirty="0" err="1" smtClean="0"/>
-              <a:t>Direccion</a:t>
-            </a:r>
-            <a:r>
-              <a:rPr lang="en-US" dirty="0" smtClean="0"/>
-              <a:t> General.</a:t>
-            </a:r>
+              <a:t>indefinida</a:t>
+            </a:r>
+            <a:endParaRPr lang="en-US" dirty="0" smtClean="0"/>
           </a:p>
           <a:p>
             <a:endParaRPr lang="en-US" dirty="0"/>
@@ -4578,6 +5182,13 @@
   <p:clrMapOvr>
     <a:masterClrMapping/>
   </p:clrMapOvr>
+  <p:timing>
+    <p:tnLst>
+      <p:par>
+        <p:cTn id="1" dur="indefinite" restart="never" nodeType="tmRoot"/>
+      </p:par>
+    </p:tnLst>
+  </p:timing>
 </p:sld>
 </file>
 
@@ -4627,104 +5238,297 @@
             </a:r>
             <a:r>
               <a:rPr lang="en-US" dirty="0" smtClean="0"/>
+              <a:t> </a:t>
+            </a:r>
+            <a:r>
+              <a:rPr lang="en-US" dirty="0" smtClean="0"/>
+              <a:t>de </a:t>
+            </a:r>
+            <a:r>
+              <a:rPr lang="en-US" dirty="0" err="1" smtClean="0"/>
+              <a:t>Producto</a:t>
+            </a:r>
+            <a:endParaRPr lang="en-US" dirty="0"/>
+          </a:p>
+        </p:txBody>
+      </p:sp>
+      <p:sp>
+        <p:nvSpPr>
+          <p:cNvPr id="3" name="2 Marcador de contenido"/>
+          <p:cNvSpPr>
+            <a:spLocks noGrp="1"/>
+          </p:cNvSpPr>
+          <p:nvPr>
+            <p:ph sz="quarter" idx="1"/>
+          </p:nvPr>
+        </p:nvSpPr>
+        <p:spPr/>
+        <p:txBody>
+          <a:bodyPr/>
+          <a:lstStyle/>
+          <a:p>
+            <a:r>
+              <a:rPr lang="en-US" dirty="0" err="1" smtClean="0"/>
+              <a:t>Problemas</a:t>
+            </a:r>
+            <a:r>
+              <a:rPr lang="en-US" dirty="0" smtClean="0"/>
+              <a:t>  </a:t>
+            </a:r>
+            <a:r>
+              <a:rPr lang="en-US" dirty="0" err="1" smtClean="0"/>
+              <a:t>para</a:t>
+            </a:r>
+            <a:r>
+              <a:rPr lang="en-US" dirty="0" smtClean="0"/>
+              <a:t> </a:t>
+            </a:r>
+            <a:r>
+              <a:rPr lang="en-US" dirty="0" err="1" smtClean="0"/>
+              <a:t>generar</a:t>
+            </a:r>
+            <a:r>
+              <a:rPr lang="en-US" dirty="0" smtClean="0"/>
+              <a:t> valor </a:t>
+            </a:r>
+            <a:r>
+              <a:rPr lang="en-US" dirty="0" err="1" smtClean="0"/>
+              <a:t>agregado</a:t>
+            </a:r>
+            <a:endParaRPr lang="en-US" dirty="0" smtClean="0"/>
+          </a:p>
+          <a:p>
+            <a:pPr lvl="1"/>
+            <a:r>
+              <a:rPr lang="en-US" dirty="0" smtClean="0"/>
+              <a:t>No </a:t>
+            </a:r>
+            <a:r>
+              <a:rPr lang="en-US" dirty="0" smtClean="0"/>
+              <a:t>se </a:t>
+            </a:r>
+            <a:r>
+              <a:rPr lang="en-US" dirty="0" err="1" smtClean="0"/>
+              <a:t>utilizan</a:t>
+            </a:r>
+            <a:r>
+              <a:rPr lang="en-US" dirty="0" smtClean="0"/>
+              <a:t> los </a:t>
+            </a:r>
+            <a:r>
+              <a:rPr lang="en-US" dirty="0" err="1" smtClean="0"/>
+              <a:t>resultados</a:t>
+            </a:r>
+            <a:r>
+              <a:rPr lang="en-US" dirty="0" smtClean="0"/>
+              <a:t> de </a:t>
+            </a:r>
+            <a:r>
+              <a:rPr lang="en-US" dirty="0" err="1" smtClean="0"/>
+              <a:t>Investigaciones</a:t>
+            </a:r>
+            <a:r>
+              <a:rPr lang="en-US" dirty="0" smtClean="0"/>
+              <a:t> de Marketing</a:t>
+            </a:r>
+            <a:r>
+              <a:rPr lang="en-US" dirty="0" smtClean="0"/>
+              <a:t>.</a:t>
+            </a:r>
+          </a:p>
+          <a:p>
+            <a:pPr lvl="1"/>
+            <a:r>
+              <a:rPr lang="en-US" dirty="0" err="1" smtClean="0"/>
+              <a:t>Falta</a:t>
+            </a:r>
+            <a:r>
+              <a:rPr lang="en-US" dirty="0" smtClean="0"/>
+              <a:t> de </a:t>
+            </a:r>
+            <a:r>
+              <a:rPr lang="en-US" dirty="0" err="1" smtClean="0"/>
+              <a:t>integración</a:t>
+            </a:r>
+            <a:r>
+              <a:rPr lang="en-US" dirty="0" smtClean="0"/>
+              <a:t> entre los </a:t>
+            </a:r>
+            <a:r>
+              <a:rPr lang="en-US" dirty="0" err="1" smtClean="0"/>
+              <a:t>trabajos</a:t>
+            </a:r>
+            <a:r>
+              <a:rPr lang="en-US" dirty="0" smtClean="0"/>
+              <a:t> de </a:t>
+            </a:r>
+            <a:r>
+              <a:rPr lang="en-US" dirty="0" err="1" smtClean="0"/>
+              <a:t>distintos</a:t>
+            </a:r>
+            <a:r>
+              <a:rPr lang="en-US" dirty="0" smtClean="0"/>
+              <a:t> </a:t>
+            </a:r>
+            <a:r>
+              <a:rPr lang="en-US" dirty="0" err="1" smtClean="0"/>
+              <a:t>departamentos</a:t>
+            </a:r>
+            <a:endParaRPr lang="en-US" dirty="0" smtClean="0"/>
+          </a:p>
+          <a:p>
+            <a:r>
+              <a:rPr lang="en-US" dirty="0" err="1" smtClean="0"/>
+              <a:t>Malas</a:t>
+            </a:r>
+            <a:r>
+              <a:rPr lang="en-US" dirty="0" smtClean="0"/>
+              <a:t> </a:t>
+            </a:r>
+            <a:r>
+              <a:rPr lang="en-US" dirty="0" err="1" smtClean="0"/>
+              <a:t>inversiones</a:t>
+            </a:r>
+            <a:r>
+              <a:rPr lang="en-US" dirty="0" smtClean="0"/>
+              <a:t> </a:t>
+            </a:r>
+            <a:r>
+              <a:rPr lang="en-US" dirty="0" err="1" smtClean="0"/>
+              <a:t>comerciales</a:t>
+            </a:r>
+            <a:endParaRPr lang="en-US" dirty="0" smtClean="0"/>
+          </a:p>
+          <a:p>
+            <a:pPr lvl="1"/>
+            <a:r>
+              <a:rPr lang="en-US" dirty="0" err="1" smtClean="0"/>
+              <a:t>Esfuerzos</a:t>
+            </a:r>
+            <a:r>
+              <a:rPr lang="en-US" dirty="0" smtClean="0"/>
+              <a:t> </a:t>
+            </a:r>
+            <a:r>
+              <a:rPr lang="en-US" dirty="0" err="1" smtClean="0"/>
+              <a:t>dispersos</a:t>
+            </a:r>
+            <a:r>
+              <a:rPr lang="en-US" dirty="0" smtClean="0"/>
+              <a:t> en </a:t>
+            </a:r>
+            <a:r>
+              <a:rPr lang="en-US" dirty="0" err="1" smtClean="0"/>
+              <a:t>demasiados</a:t>
+            </a:r>
+            <a:r>
+              <a:rPr lang="en-US" dirty="0" smtClean="0"/>
+              <a:t> </a:t>
+            </a:r>
+            <a:r>
+              <a:rPr lang="en-US" dirty="0" err="1" smtClean="0"/>
+              <a:t>productos</a:t>
+            </a:r>
+            <a:endParaRPr lang="en-US" dirty="0" smtClean="0"/>
+          </a:p>
+          <a:p>
+            <a:r>
+              <a:rPr lang="en-US" dirty="0" err="1" smtClean="0"/>
+              <a:t>Falta</a:t>
+            </a:r>
+            <a:r>
+              <a:rPr lang="en-US" dirty="0" smtClean="0"/>
+              <a:t> de </a:t>
+            </a:r>
+            <a:r>
+              <a:rPr lang="en-US" dirty="0" err="1" smtClean="0"/>
+              <a:t>flexibilidad</a:t>
+            </a:r>
+            <a:r>
+              <a:rPr lang="en-US" dirty="0" smtClean="0"/>
+              <a:t> </a:t>
+            </a:r>
+            <a:r>
+              <a:rPr lang="en-US" dirty="0" err="1" smtClean="0"/>
+              <a:t>Frente</a:t>
+            </a:r>
+            <a:r>
+              <a:rPr lang="en-US" dirty="0" smtClean="0"/>
+              <a:t> a </a:t>
+            </a:r>
+            <a:r>
+              <a:rPr lang="en-US" dirty="0" err="1" smtClean="0"/>
+              <a:t>las</a:t>
+            </a:r>
+            <a:r>
+              <a:rPr lang="en-US" dirty="0" smtClean="0"/>
+              <a:t> </a:t>
+            </a:r>
+            <a:r>
+              <a:rPr lang="en-US" dirty="0" err="1" smtClean="0"/>
+              <a:t>fluctuaciones</a:t>
+            </a:r>
+            <a:r>
+              <a:rPr lang="en-US" dirty="0" smtClean="0"/>
               <a:t> del </a:t>
             </a:r>
             <a:r>
               <a:rPr lang="en-US" dirty="0" err="1" smtClean="0"/>
-              <a:t>Producto</a:t>
-            </a:r>
-            <a:endParaRPr lang="en-US" dirty="0"/>
-          </a:p>
-        </p:txBody>
-      </p:sp>
-      <p:sp>
-        <p:nvSpPr>
-          <p:cNvPr id="3" name="2 Marcador de contenido"/>
-          <p:cNvSpPr>
-            <a:spLocks noGrp="1"/>
-          </p:cNvSpPr>
-          <p:nvPr>
-            <p:ph sz="quarter" idx="1"/>
-          </p:nvPr>
-        </p:nvSpPr>
-        <p:spPr/>
-        <p:txBody>
-          <a:bodyPr/>
-          <a:lstStyle/>
-          <a:p>
-            <a:r>
-              <a:rPr lang="en-US" dirty="0" err="1" smtClean="0"/>
-              <a:t>Falta</a:t>
+              <a:t>mercado</a:t>
+            </a:r>
+            <a:endParaRPr lang="en-US" dirty="0" smtClean="0"/>
+          </a:p>
+          <a:p>
+            <a:pPr lvl="1"/>
+            <a:r>
+              <a:rPr lang="en-US" dirty="0" smtClean="0"/>
+              <a:t>No se </a:t>
+            </a:r>
+            <a:r>
+              <a:rPr lang="en-US" dirty="0" err="1" smtClean="0"/>
+              <a:t>implementaron</a:t>
+            </a:r>
+            <a:r>
+              <a:rPr lang="en-US" dirty="0" smtClean="0"/>
+              <a:t> </a:t>
+            </a:r>
+            <a:r>
+              <a:rPr lang="en-US" dirty="0" err="1" smtClean="0"/>
+              <a:t>cambios</a:t>
+            </a:r>
+            <a:r>
+              <a:rPr lang="en-US" dirty="0" smtClean="0"/>
+              <a:t> en los </a:t>
+            </a:r>
+            <a:r>
+              <a:rPr lang="en-US" dirty="0" err="1" smtClean="0"/>
+              <a:t>productos</a:t>
+            </a:r>
+            <a:r>
+              <a:rPr lang="en-US" dirty="0" smtClean="0"/>
+              <a:t> </a:t>
+            </a:r>
+            <a:r>
+              <a:rPr lang="en-US" dirty="0" err="1" smtClean="0"/>
+              <a:t>ofrecidos</a:t>
+            </a:r>
+            <a:r>
+              <a:rPr lang="en-US" dirty="0" smtClean="0"/>
+              <a:t> a </a:t>
+            </a:r>
+            <a:r>
+              <a:rPr lang="en-US" dirty="0" err="1" smtClean="0"/>
+              <a:t>pesar</a:t>
             </a:r>
             <a:r>
               <a:rPr lang="en-US" dirty="0" smtClean="0"/>
               <a:t> de </a:t>
             </a:r>
             <a:r>
-              <a:rPr lang="en-US" dirty="0" err="1" smtClean="0"/>
-              <a:t>agregado</a:t>
-            </a:r>
-            <a:r>
-              <a:rPr lang="en-US" dirty="0" smtClean="0"/>
-              <a:t> del valor.</a:t>
-            </a:r>
-          </a:p>
-          <a:p>
-            <a:r>
-              <a:rPr lang="en-US" dirty="0" smtClean="0"/>
-              <a:t>No se </a:t>
-            </a:r>
-            <a:r>
-              <a:rPr lang="en-US" dirty="0" err="1" smtClean="0"/>
-              <a:t>utilizan</a:t>
-            </a:r>
-            <a:r>
-              <a:rPr lang="en-US" dirty="0" smtClean="0"/>
-              <a:t> los </a:t>
-            </a:r>
-            <a:r>
-              <a:rPr lang="en-US" dirty="0" err="1" smtClean="0"/>
-              <a:t>resultados</a:t>
-            </a:r>
-            <a:r>
-              <a:rPr lang="en-US" dirty="0" smtClean="0"/>
-              <a:t> de </a:t>
-            </a:r>
-            <a:r>
-              <a:rPr lang="en-US" dirty="0" err="1" smtClean="0"/>
-              <a:t>Investigaciones</a:t>
-            </a:r>
-            <a:r>
-              <a:rPr lang="en-US" dirty="0" smtClean="0"/>
-              <a:t> de Marketing.</a:t>
-            </a:r>
-          </a:p>
-          <a:p>
-            <a:r>
-              <a:rPr lang="en-US" dirty="0" err="1" smtClean="0"/>
-              <a:t>Malas</a:t>
-            </a:r>
-            <a:r>
-              <a:rPr lang="en-US" dirty="0" smtClean="0"/>
-              <a:t> </a:t>
-            </a:r>
-            <a:r>
-              <a:rPr lang="en-US" dirty="0" err="1" smtClean="0"/>
-              <a:t>inversiones</a:t>
-            </a:r>
-            <a:r>
-              <a:rPr lang="en-US" dirty="0" smtClean="0"/>
-              <a:t> </a:t>
-            </a:r>
-            <a:r>
-              <a:rPr lang="en-US" dirty="0" err="1" smtClean="0"/>
-              <a:t>comerciales</a:t>
-            </a:r>
-            <a:r>
-              <a:rPr lang="en-US" dirty="0" smtClean="0"/>
-              <a:t>.</a:t>
-            </a:r>
-            <a:endParaRPr lang="en-US" dirty="0"/>
+              <a:rPr lang="en-US" smtClean="0"/>
+              <a:t>la crisis</a:t>
+            </a:r>
+            <a:endParaRPr lang="en-US" dirty="0" smtClean="0"/>
           </a:p>
         </p:txBody>
       </p:sp>
@@ -4733,6 +5537,13 @@
   <p:clrMapOvr>
     <a:masterClrMapping/>
   </p:clrMapOvr>
+  <p:timing>
+    <p:tnLst>
+      <p:par>
+        <p:cTn id="1" dur="indefinite" restart="never" nodeType="tmRoot"/>
+      </p:par>
+    </p:tnLst>
+  </p:timing>
 </p:sld>
 </file>
 
@@ -4774,11 +5585,7 @@
             </a:r>
             <a:r>
               <a:rPr lang="en-US" dirty="0" smtClean="0"/>
-              <a:t>: </a:t>
-            </a:r>
-            <a:r>
-              <a:rPr lang="en-US" dirty="0" smtClean="0"/>
-              <a:t>Marketing</a:t>
+              <a:t>: Marketing</a:t>
             </a:r>
             <a:endParaRPr lang="en-US" dirty="0"/>
           </a:p>
@@ -4811,15 +5618,106 @@
               <a:rPr lang="en-US" dirty="0" err="1" smtClean="0"/>
               <a:t>comercial</a:t>
             </a:r>
+            <a:endParaRPr lang="en-US" dirty="0" smtClean="0"/>
+          </a:p>
+          <a:p>
+            <a:pPr lvl="1"/>
+            <a:r>
+              <a:rPr lang="en-US" dirty="0" smtClean="0"/>
+              <a:t>Mal </a:t>
+            </a:r>
+            <a:r>
+              <a:rPr lang="en-US" dirty="0" err="1" smtClean="0"/>
+              <a:t>concepto</a:t>
+            </a:r>
+            <a:r>
+              <a:rPr lang="en-US" dirty="0" smtClean="0"/>
+              <a:t> de la </a:t>
+            </a:r>
+            <a:r>
+              <a:rPr lang="en-US" dirty="0" err="1" smtClean="0"/>
+              <a:t>empresa</a:t>
+            </a:r>
+            <a:r>
+              <a:rPr lang="en-US" dirty="0" smtClean="0"/>
+              <a:t> </a:t>
+            </a:r>
+            <a:r>
+              <a:rPr lang="en-US" dirty="0" err="1" smtClean="0"/>
+              <a:t>luego</a:t>
+            </a:r>
+            <a:r>
+              <a:rPr lang="en-US" dirty="0" smtClean="0"/>
+              <a:t> del </a:t>
+            </a:r>
+            <a:r>
+              <a:rPr lang="en-US" dirty="0" err="1" smtClean="0"/>
+              <a:t>escándalo</a:t>
+            </a:r>
+            <a:r>
+              <a:rPr lang="en-US" dirty="0" smtClean="0"/>
+              <a:t> de </a:t>
+            </a:r>
+            <a:r>
+              <a:rPr lang="en-US" dirty="0" err="1" smtClean="0"/>
+              <a:t>A</a:t>
+            </a:r>
+            <a:r>
+              <a:rPr lang="en-US" dirty="0" err="1" smtClean="0"/>
+              <a:t>erolíneas</a:t>
+            </a:r>
+            <a:r>
+              <a:rPr lang="en-US" dirty="0" smtClean="0"/>
+              <a:t> </a:t>
+            </a:r>
+            <a:r>
+              <a:rPr lang="en-US" dirty="0" err="1" smtClean="0"/>
+              <a:t>A</a:t>
+            </a:r>
+            <a:r>
+              <a:rPr lang="en-US" dirty="0" err="1" smtClean="0"/>
+              <a:t>rgentinas</a:t>
+            </a:r>
             <a:endParaRPr lang="en-US" dirty="0"/>
           </a:p>
         </p:txBody>
       </p:sp>
+      <p:pic>
+        <p:nvPicPr>
+          <p:cNvPr id="4" name="3 Imagen" descr="viaje-en-aerolineas-argentinas.jpg"/>
+          <p:cNvPicPr>
+            <a:picLocks noChangeAspect="1"/>
+          </p:cNvPicPr>
+          <p:nvPr/>
+        </p:nvPicPr>
+        <p:blipFill>
+          <a:blip r:embed="rId2" cstate="print"/>
+          <a:stretch>
+            <a:fillRect/>
+          </a:stretch>
+        </p:blipFill>
+        <p:spPr>
+          <a:xfrm>
+            <a:off x="2819400" y="2819400"/>
+            <a:ext cx="3448050" cy="2868778"/>
+          </a:xfrm>
+          <a:prstGeom prst="rect">
+            <a:avLst/>
+          </a:prstGeom>
+        </p:spPr>
+      </p:pic>
     </p:spTree>
   </p:cSld>
   <p:clrMapOvr>
     <a:masterClrMapping/>
   </p:clrMapOvr>
+  <p:timing>
+    <p:tnLst>
+      <p:par>
+        <p:cTn id="1" dur="indefinite" restart="never" nodeType="tmRoot"/>
+      </p:par>
+    </p:tnLst>
+  </p:timing>
 </p:sld>
 </file>
 
@@ -4914,14 +5812,31 @@
               <a:rPr lang="en-US" dirty="0" err="1" smtClean="0"/>
               <a:t>sueldos</a:t>
             </a:r>
-            <a:r>
-              <a:rPr lang="en-US" dirty="0" smtClean="0"/>
-              <a:t>.</a:t>
-            </a:r>
-          </a:p>
-          <a:p>
-            <a:r>
-              <a:rPr lang="en-US" smtClean="0"/>
+            <a:endParaRPr lang="en-US" dirty="0" smtClean="0"/>
+          </a:p>
+          <a:p>
+            <a:pPr lvl="1"/>
+            <a:r>
+              <a:rPr lang="en-US" dirty="0" err="1" smtClean="0"/>
+              <a:t>Disconformidad</a:t>
+            </a:r>
+            <a:r>
+              <a:rPr lang="en-US" dirty="0" smtClean="0"/>
+              <a:t> </a:t>
+            </a:r>
+            <a:r>
+              <a:rPr lang="en-US" dirty="0" smtClean="0"/>
+              <a:t>de los </a:t>
+            </a:r>
+            <a:r>
+              <a:rPr lang="en-US" dirty="0" err="1" smtClean="0"/>
+              <a:t>recursos</a:t>
+            </a:r>
+            <a:endParaRPr lang="en-US" dirty="0" smtClean="0"/>
+          </a:p>
+          <a:p>
+            <a:r>
+              <a:rPr lang="en-US" dirty="0" err="1" smtClean="0"/>
               <a:t>Despidos</a:t>
             </a:r>
             <a:r>
@@ -4956,10 +5871,39 @@
               <a:rPr lang="en-US" dirty="0" err="1" smtClean="0"/>
               <a:t>costos</a:t>
             </a:r>
-            <a:r>
-              <a:rPr lang="en-US" dirty="0" smtClean="0"/>
-              <a:t>.</a:t>
-            </a:r>
+            <a:endParaRPr lang="en-US" dirty="0" smtClean="0"/>
+          </a:p>
+          <a:p>
+            <a:pPr lvl="1"/>
+            <a:r>
+              <a:rPr lang="en-US" dirty="0" err="1" smtClean="0"/>
+              <a:t>Incertidumbre</a:t>
+            </a:r>
+            <a:r>
+              <a:rPr lang="en-US" dirty="0" smtClean="0"/>
+              <a:t>,  </a:t>
+            </a:r>
+            <a:r>
+              <a:rPr lang="en-US" dirty="0" err="1" smtClean="0"/>
+              <a:t>falta</a:t>
+            </a:r>
+            <a:r>
+              <a:rPr lang="en-US" dirty="0" smtClean="0"/>
+              <a:t> de </a:t>
+            </a:r>
+            <a:r>
+              <a:rPr lang="en-US" dirty="0" err="1" smtClean="0"/>
+              <a:t>entusiasmo</a:t>
+            </a:r>
+            <a:r>
+              <a:rPr lang="en-US" dirty="0" smtClean="0"/>
+              <a:t> y </a:t>
+            </a:r>
+            <a:r>
+              <a:rPr lang="en-US" dirty="0" err="1" smtClean="0"/>
+              <a:t>responsabilidad</a:t>
+            </a:r>
+            <a:endParaRPr lang="en-US" dirty="0" smtClean="0"/>
           </a:p>
           <a:p>
             <a:endParaRPr lang="en-US" dirty="0"/>
@@ -4971,13 +5915,201 @@
   <p:clrMapOvr>
     <a:masterClrMapping/>
   </p:clrMapOvr>
+  <p:timing>
+    <p:tnLst>
+      <p:par>
+        <p:cTn id="1" dur="indefinite" restart="never" nodeType="tmRoot"/>
+      </p:par>
+    </p:tnLst>
+  </p:timing>
+</p:sld>
+</file>
+
+<file path=ppt/slides/slide8.xml><?xml version="1.0" encoding="utf-8"?>
+<p:sld xmlns:a="http://schemas.openxmlformats.org/drawingml/2006/main" xmlns:r="http://schemas.openxmlformats.org/officeDocument/2006/relationships" xmlns:p="http://schemas.openxmlformats.org/presentationml/2006/main">
+  <p:cSld>
+    <p:spTree>
+      <p:nvGrpSpPr>
+        <p:cNvPr id="1" name=""/>
+        <p:cNvGrpSpPr/>
+        <p:nvPr/>
+      </p:nvGrpSpPr>
+      <p:grpSpPr>
+        <a:xfrm>
+          <a:off x="0" y="0"/>
+          <a:ext cx="0" cy="0"/>
+          <a:chOff x="0" y="0"/>
+          <a:chExt cx="0" cy="0"/>
+        </a:xfrm>
+      </p:grpSpPr>
+      <p:sp>
+        <p:nvSpPr>
+          <p:cNvPr id="2" name="1 Título"/>
+          <p:cNvSpPr>
+            <a:spLocks noGrp="1"/>
+          </p:cNvSpPr>
+          <p:nvPr>
+            <p:ph type="title"/>
+          </p:nvPr>
+        </p:nvSpPr>
+        <p:spPr/>
+        <p:txBody>
+          <a:bodyPr/>
+          <a:lstStyle/>
+          <a:p>
+            <a:r>
+              <a:rPr lang="es-AR" dirty="0" smtClean="0"/>
+              <a:t>Problemas: Inestabilidad Financiera (II)</a:t>
+            </a:r>
+            <a:endParaRPr lang="es-AR" dirty="0"/>
+          </a:p>
+        </p:txBody>
+      </p:sp>
+      <p:graphicFrame>
+        <p:nvGraphicFramePr>
+          <p:cNvPr id="6" name="2 Gráfico"/>
+          <p:cNvGraphicFramePr>
+            <a:graphicFrameLocks noGrp="1"/>
+          </p:cNvGraphicFramePr>
+          <p:nvPr>
+            <p:ph sz="quarter" idx="1"/>
+          </p:nvPr>
+        </p:nvGraphicFramePr>
+        <p:xfrm>
+          <a:off x="457200" y="1219200"/>
+          <a:ext cx="8229600" cy="4937125"/>
+        </p:xfrm>
+        <a:graphic>
+          <a:graphicData uri="http://schemas.openxmlformats.org/drawingml/2006/chart">
+            <c:chart xmlns:c="http://schemas.openxmlformats.org/drawingml/2006/chart" xmlns:r="http://schemas.openxmlformats.org/officeDocument/2006/relationships" r:id="rId2"/>
+          </a:graphicData>
+        </a:graphic>
+      </p:graphicFrame>
+    </p:spTree>
+  </p:cSld>
+  <p:clrMapOvr>
+    <a:masterClrMapping/>
+  </p:clrMapOvr>
+  <p:timing>
+    <p:tnLst>
+      <p:par>
+        <p:cTn id="1" dur="indefinite" restart="never" nodeType="tmRoot"/>
+      </p:par>
+    </p:tnLst>
+  </p:timing>
+</p:sld>
+</file>
+
+<file path=ppt/slides/slide9.xml><?xml version="1.0" encoding="utf-8"?>
+<p:sld xmlns:a="http://schemas.openxmlformats.org/drawingml/2006/main" xmlns:r="http://schemas.openxmlformats.org/officeDocument/2006/relationships" xmlns:p="http://schemas.openxmlformats.org/presentationml/2006/main">
+  <p:cSld>
+    <p:spTree>
+      <p:nvGrpSpPr>
+        <p:cNvPr id="1" name=""/>
+        <p:cNvGrpSpPr/>
+        <p:nvPr/>
+      </p:nvGrpSpPr>
+      <p:grpSpPr>
+        <a:xfrm>
+          <a:off x="0" y="0"/>
+          <a:ext cx="0" cy="0"/>
+          <a:chOff x="0" y="0"/>
+          <a:chExt cx="0" cy="0"/>
+        </a:xfrm>
+      </p:grpSpPr>
+      <p:sp>
+        <p:nvSpPr>
+          <p:cNvPr id="2" name="1 Título"/>
+          <p:cNvSpPr>
+            <a:spLocks noGrp="1"/>
+          </p:cNvSpPr>
+          <p:nvPr>
+            <p:ph type="title"/>
+          </p:nvPr>
+        </p:nvSpPr>
+        <p:spPr/>
+        <p:txBody>
+          <a:bodyPr/>
+          <a:lstStyle/>
+          <a:p>
+            <a:r>
+              <a:rPr lang="es-AR" dirty="0" smtClean="0"/>
+              <a:t>Propuestas de cambio</a:t>
+            </a:r>
+            <a:endParaRPr lang="es-AR" dirty="0"/>
+          </a:p>
+        </p:txBody>
+      </p:sp>
+      <p:sp>
+        <p:nvSpPr>
+          <p:cNvPr id="3" name="2 Marcador de contenido"/>
+          <p:cNvSpPr>
+            <a:spLocks noGrp="1"/>
+          </p:cNvSpPr>
+          <p:nvPr>
+            <p:ph sz="quarter" idx="1"/>
+          </p:nvPr>
+        </p:nvSpPr>
+        <p:spPr/>
+        <p:txBody>
+          <a:bodyPr/>
+          <a:lstStyle/>
+          <a:p>
+            <a:r>
+              <a:rPr lang="es-AR" dirty="0" smtClean="0"/>
+              <a:t>Problemas de diseño y cambio organizacional</a:t>
+            </a:r>
+          </a:p>
+          <a:p>
+            <a:pPr lvl="1"/>
+            <a:r>
+              <a:rPr lang="es-AR" dirty="0" smtClean="0"/>
+              <a:t>Fusión de la Gerencia de Finanzas y la de Administración en una que abarcaría las áreas de Recursos Humanos, Sistemas y Finanzas</a:t>
+            </a:r>
+          </a:p>
+          <a:p>
+            <a:pPr lvl="1"/>
+            <a:r>
+              <a:rPr lang="es-AR" dirty="0" smtClean="0"/>
+              <a:t>Creación de una Gerencia de Producto que abarque las áreas de Planificación y compras</a:t>
+            </a:r>
+          </a:p>
+          <a:p>
+            <a:pPr lvl="1"/>
+            <a:r>
+              <a:rPr lang="es-AR" dirty="0" smtClean="0"/>
+              <a:t>Creación de una Gerencia de Comercialización que nuclee el área de Marketing y Promoción y la de Ventas</a:t>
+            </a:r>
+          </a:p>
+          <a:p>
+            <a:pPr lvl="1"/>
+            <a:r>
+              <a:rPr lang="es-AR" dirty="0" smtClean="0"/>
+              <a:t>Creación de un Comité Directivo para mejorar el proceso de toma de decisiones</a:t>
+            </a:r>
+            <a:endParaRPr lang="es-AR" dirty="0"/>
+          </a:p>
+        </p:txBody>
+      </p:sp>
+    </p:spTree>
+  </p:cSld>
+  <p:clrMapOvr>
+    <a:masterClrMapping/>
+  </p:clrMapOvr>
+  <p:timing>
+    <p:tnLst>
+      <p:par>
+        <p:cTn id="1" dur="indefinite" restart="never" nodeType="tmRoot"/>
+      </p:par>
+    </p:tnLst>
+  </p:timing>
 </p:sld>
 </file>
 
 <file path=ppt/theme/theme1.xml><?xml version="1.0" encoding="utf-8"?>
 <a:theme xmlns:a="http://schemas.openxmlformats.org/drawingml/2006/main" name="Origen">
   <a:themeElements>
-    <a:clrScheme name="Origen">
+    <a:clrScheme name="Personalizado 1">
       <a:dk1>
         <a:sysClr val="windowText" lastClr="000000"/>
       </a:dk1>
@@ -4991,10 +6123,10 @@
         <a:srgbClr val="DDE9EC"/>
       </a:lt2>
       <a:accent1>
-        <a:srgbClr val="727CA3"/>
+        <a:srgbClr val="C00000"/>
       </a:accent1>
       <a:accent2>
-        <a:srgbClr val="9FB8CD"/>
+        <a:srgbClr val="F2AD7A"/>
       </a:accent2>
       <a:accent3>
         <a:srgbClr val="D2DA7A"/>
@@ -5009,10 +6141,10 @@
         <a:srgbClr val="8E736A"/>
       </a:accent6>
       <a:hlink>
-        <a:srgbClr val="B292CA"/>
+        <a:srgbClr val="945D4A"/>
       </a:hlink>
       <a:folHlink>
-        <a:srgbClr val="6B5680"/>
+        <a:srgbClr val="633E31"/>
       </a:folHlink>
     </a:clrScheme>
     <a:fontScheme name="Origen">

</xml_diff>